<commit_message>
adding whole blood results
</commit_message>
<xml_diff>
--- a/pipeline_GTEx/v8/results/fitting_ase_counts.pptx
+++ b/pipeline_GTEx/v8/results/fitting_ase_counts.pptx
@@ -13,6 +13,10 @@
     <p:sldId id="260" r:id="rId7"/>
     <p:sldId id="261" r:id="rId8"/>
     <p:sldId id="264" r:id="rId9"/>
+    <p:sldId id="265" r:id="rId10"/>
+    <p:sldId id="266" r:id="rId11"/>
+    <p:sldId id="267" r:id="rId12"/>
+    <p:sldId id="268" r:id="rId13"/>
   </p:sldIdLst>
   <p:sldSz cx="9144000" cy="6858000" type="screen4x3"/>
   <p:notesSz cx="6858000" cy="9144000"/>
@@ -295,7 +299,7 @@
           <a:p>
             <a:fld id="{1D7EA44C-82BF-4A01-94DA-2A2C87712364}" type="datetimeFigureOut">
               <a:rPr lang="en-US" smtClean="0"/>
-              <a:t>2/27/2020</a:t>
+              <a:t>3/10/2020</a:t>
             </a:fld>
             <a:endParaRPr lang="en-US"/>
           </a:p>
@@ -465,7 +469,7 @@
           <a:p>
             <a:fld id="{1D7EA44C-82BF-4A01-94DA-2A2C87712364}" type="datetimeFigureOut">
               <a:rPr lang="en-US" smtClean="0"/>
-              <a:t>2/27/2020</a:t>
+              <a:t>3/10/2020</a:t>
             </a:fld>
             <a:endParaRPr lang="en-US"/>
           </a:p>
@@ -645,7 +649,7 @@
           <a:p>
             <a:fld id="{1D7EA44C-82BF-4A01-94DA-2A2C87712364}" type="datetimeFigureOut">
               <a:rPr lang="en-US" smtClean="0"/>
-              <a:t>2/27/2020</a:t>
+              <a:t>3/10/2020</a:t>
             </a:fld>
             <a:endParaRPr lang="en-US"/>
           </a:p>
@@ -815,7 +819,7 @@
           <a:p>
             <a:fld id="{1D7EA44C-82BF-4A01-94DA-2A2C87712364}" type="datetimeFigureOut">
               <a:rPr lang="en-US" smtClean="0"/>
-              <a:t>2/27/2020</a:t>
+              <a:t>3/10/2020</a:t>
             </a:fld>
             <a:endParaRPr lang="en-US"/>
           </a:p>
@@ -1061,7 +1065,7 @@
           <a:p>
             <a:fld id="{1D7EA44C-82BF-4A01-94DA-2A2C87712364}" type="datetimeFigureOut">
               <a:rPr lang="en-US" smtClean="0"/>
-              <a:t>2/27/2020</a:t>
+              <a:t>3/10/2020</a:t>
             </a:fld>
             <a:endParaRPr lang="en-US"/>
           </a:p>
@@ -1349,7 +1353,7 @@
           <a:p>
             <a:fld id="{1D7EA44C-82BF-4A01-94DA-2A2C87712364}" type="datetimeFigureOut">
               <a:rPr lang="en-US" smtClean="0"/>
-              <a:t>2/27/2020</a:t>
+              <a:t>3/10/2020</a:t>
             </a:fld>
             <a:endParaRPr lang="en-US"/>
           </a:p>
@@ -1771,7 +1775,7 @@
           <a:p>
             <a:fld id="{1D7EA44C-82BF-4A01-94DA-2A2C87712364}" type="datetimeFigureOut">
               <a:rPr lang="en-US" smtClean="0"/>
-              <a:t>2/27/2020</a:t>
+              <a:t>3/10/2020</a:t>
             </a:fld>
             <a:endParaRPr lang="en-US"/>
           </a:p>
@@ -1889,7 +1893,7 @@
           <a:p>
             <a:fld id="{1D7EA44C-82BF-4A01-94DA-2A2C87712364}" type="datetimeFigureOut">
               <a:rPr lang="en-US" smtClean="0"/>
-              <a:t>2/27/2020</a:t>
+              <a:t>3/10/2020</a:t>
             </a:fld>
             <a:endParaRPr lang="en-US"/>
           </a:p>
@@ -1984,7 +1988,7 @@
           <a:p>
             <a:fld id="{1D7EA44C-82BF-4A01-94DA-2A2C87712364}" type="datetimeFigureOut">
               <a:rPr lang="en-US" smtClean="0"/>
-              <a:t>2/27/2020</a:t>
+              <a:t>3/10/2020</a:t>
             </a:fld>
             <a:endParaRPr lang="en-US"/>
           </a:p>
@@ -2261,7 +2265,7 @@
           <a:p>
             <a:fld id="{1D7EA44C-82BF-4A01-94DA-2A2C87712364}" type="datetimeFigureOut">
               <a:rPr lang="en-US" smtClean="0"/>
-              <a:t>2/27/2020</a:t>
+              <a:t>3/10/2020</a:t>
             </a:fld>
             <a:endParaRPr lang="en-US"/>
           </a:p>
@@ -2514,7 +2518,7 @@
           <a:p>
             <a:fld id="{1D7EA44C-82BF-4A01-94DA-2A2C87712364}" type="datetimeFigureOut">
               <a:rPr lang="en-US" smtClean="0"/>
-              <a:t>2/27/2020</a:t>
+              <a:t>3/10/2020</a:t>
             </a:fld>
             <a:endParaRPr lang="en-US"/>
           </a:p>
@@ -2727,7 +2731,7 @@
           <a:p>
             <a:fld id="{1D7EA44C-82BF-4A01-94DA-2A2C87712364}" type="datetimeFigureOut">
               <a:rPr lang="en-US" smtClean="0"/>
-              <a:t>2/27/2020</a:t>
+              <a:t>3/10/2020</a:t>
             </a:fld>
             <a:endParaRPr lang="en-US"/>
           </a:p>
@@ -3153,6 +3157,784 @@
 </p:sld>
 </file>
 
+<file path=ppt/slides/slide10.xml><?xml version="1.0" encoding="utf-8"?>
+<p:sld xmlns:a="http://schemas.openxmlformats.org/drawingml/2006/main" xmlns:r="http://schemas.openxmlformats.org/officeDocument/2006/relationships" xmlns:p="http://schemas.openxmlformats.org/presentationml/2006/main">
+  <p:cSld>
+    <p:spTree>
+      <p:nvGrpSpPr>
+        <p:cNvPr id="1" name=""/>
+        <p:cNvGrpSpPr/>
+        <p:nvPr/>
+      </p:nvGrpSpPr>
+      <p:grpSpPr>
+        <a:xfrm>
+          <a:off x="0" y="0"/>
+          <a:ext cx="0" cy="0"/>
+          <a:chOff x="0" y="0"/>
+          <a:chExt cx="0" cy="0"/>
+        </a:xfrm>
+      </p:grpSpPr>
+      <p:sp>
+        <p:nvSpPr>
+          <p:cNvPr id="2" name="Title 1"/>
+          <p:cNvSpPr>
+            <a:spLocks noGrp="1"/>
+          </p:cNvSpPr>
+          <p:nvPr>
+            <p:ph type="title"/>
+          </p:nvPr>
+        </p:nvSpPr>
+        <p:spPr/>
+        <p:txBody>
+          <a:bodyPr/>
+          <a:lstStyle/>
+          <a:p>
+            <a:r>
+              <a:rPr lang="en-US" dirty="0" smtClean="0"/>
+              <a:t>Results v7 vs v8</a:t>
+            </a:r>
+            <a:endParaRPr lang="en-US" dirty="0"/>
+          </a:p>
+        </p:txBody>
+      </p:sp>
+      <p:graphicFrame>
+        <p:nvGraphicFramePr>
+          <p:cNvPr id="4" name="Content Placeholder 3"/>
+          <p:cNvGraphicFramePr>
+            <a:graphicFrameLocks noGrp="1"/>
+          </p:cNvGraphicFramePr>
+          <p:nvPr>
+            <p:ph idx="1"/>
+            <p:extLst>
+              <p:ext uri="{D42A27DB-BD31-4B8C-83A1-F6EECF244321}">
+                <p14:modId xmlns:p14="http://schemas.microsoft.com/office/powerpoint/2010/main" val="3520030909"/>
+              </p:ext>
+            </p:extLst>
+          </p:nvPr>
+        </p:nvGraphicFramePr>
+        <p:xfrm>
+          <a:off x="457196" y="4800600"/>
+          <a:ext cx="8229600" cy="1554480"/>
+        </p:xfrm>
+        <a:graphic>
+          <a:graphicData uri="http://schemas.openxmlformats.org/drawingml/2006/table">
+            <a:tbl>
+              <a:tblPr firstRow="1" bandRow="1">
+                <a:tableStyleId>{5C22544A-7EE6-4342-B048-85BDC9FD1C3A}</a:tableStyleId>
+              </a:tblPr>
+              <a:tblGrid>
+                <a:gridCol w="2057400"/>
+                <a:gridCol w="2057400"/>
+                <a:gridCol w="2057400"/>
+                <a:gridCol w="2057400"/>
+              </a:tblGrid>
+              <a:tr h="457200">
+                <a:tc>
+                  <a:txBody>
+                    <a:bodyPr/>
+                    <a:lstStyle/>
+                    <a:p>
+                      <a:r>
+                        <a:rPr lang="da-DK" dirty="0" smtClean="0"/>
+                        <a:t>v7\v8</a:t>
+                      </a:r>
+                    </a:p>
+                  </a:txBody>
+                  <a:tcPr/>
+                </a:tc>
+                <a:tc>
+                  <a:txBody>
+                    <a:bodyPr/>
+                    <a:lstStyle/>
+                    <a:p>
+                      <a:pPr marL="0" marR="0" indent="0" algn="l" defTabSz="914400" rtl="0" eaLnBrk="1" fontAlgn="auto" latinLnBrk="0" hangingPunct="1">
+                        <a:lnSpc>
+                          <a:spcPct val="100000"/>
+                        </a:lnSpc>
+                        <a:spcBef>
+                          <a:spcPts val="0"/>
+                        </a:spcBef>
+                        <a:spcAft>
+                          <a:spcPts val="0"/>
+                        </a:spcAft>
+                        <a:buClrTx/>
+                        <a:buSzTx/>
+                        <a:buFontTx/>
+                        <a:buNone/>
+                        <a:tabLst/>
+                        <a:defRPr/>
+                      </a:pPr>
+                      <a:r>
+                        <a:rPr lang="en-US" dirty="0" smtClean="0"/>
+                        <a:t>&gt;=0.01</a:t>
+                      </a:r>
+                    </a:p>
+                  </a:txBody>
+                  <a:tcPr/>
+                </a:tc>
+                <a:tc>
+                  <a:txBody>
+                    <a:bodyPr/>
+                    <a:lstStyle/>
+                    <a:p>
+                      <a:pPr marL="0" marR="0" indent="0" algn="l" defTabSz="914400" rtl="0" eaLnBrk="1" fontAlgn="auto" latinLnBrk="0" hangingPunct="1">
+                        <a:lnSpc>
+                          <a:spcPct val="100000"/>
+                        </a:lnSpc>
+                        <a:spcBef>
+                          <a:spcPts val="0"/>
+                        </a:spcBef>
+                        <a:spcAft>
+                          <a:spcPts val="0"/>
+                        </a:spcAft>
+                        <a:buClrTx/>
+                        <a:buSzTx/>
+                        <a:buFontTx/>
+                        <a:buNone/>
+                        <a:tabLst/>
+                        <a:defRPr/>
+                      </a:pPr>
+                      <a:r>
+                        <a:rPr lang="en-US" dirty="0" smtClean="0"/>
+                        <a:t>&lt;0.01</a:t>
+                      </a:r>
+                    </a:p>
+                  </a:txBody>
+                  <a:tcPr/>
+                </a:tc>
+                <a:tc>
+                  <a:txBody>
+                    <a:bodyPr/>
+                    <a:lstStyle/>
+                    <a:p>
+                      <a:r>
+                        <a:rPr lang="en-US" dirty="0" smtClean="0"/>
+                        <a:t>total</a:t>
+                      </a:r>
+                      <a:endParaRPr lang="en-US" dirty="0"/>
+                    </a:p>
+                  </a:txBody>
+                  <a:tcPr/>
+                </a:tc>
+              </a:tr>
+              <a:tr h="241852">
+                <a:tc>
+                  <a:txBody>
+                    <a:bodyPr/>
+                    <a:lstStyle/>
+                    <a:p>
+                      <a:r>
+                        <a:rPr lang="en-US" dirty="0" smtClean="0"/>
+                        <a:t>&gt;=0.01</a:t>
+                      </a:r>
+                      <a:endParaRPr lang="en-US" dirty="0"/>
+                    </a:p>
+                  </a:txBody>
+                  <a:tcPr/>
+                </a:tc>
+                <a:tc>
+                  <a:txBody>
+                    <a:bodyPr/>
+                    <a:lstStyle/>
+                    <a:p>
+                      <a:r>
+                        <a:rPr lang="en-US" dirty="0" smtClean="0"/>
+                        <a:t>6282</a:t>
+                      </a:r>
+                      <a:endParaRPr lang="en-US" dirty="0"/>
+                    </a:p>
+                  </a:txBody>
+                  <a:tcPr/>
+                </a:tc>
+                <a:tc>
+                  <a:txBody>
+                    <a:bodyPr/>
+                    <a:lstStyle/>
+                    <a:p>
+                      <a:r>
+                        <a:rPr lang="en-US" dirty="0" smtClean="0"/>
+                        <a:t>2120</a:t>
+                      </a:r>
+                      <a:endParaRPr lang="en-US" dirty="0"/>
+                    </a:p>
+                  </a:txBody>
+                  <a:tcPr/>
+                </a:tc>
+                <a:tc>
+                  <a:txBody>
+                    <a:bodyPr/>
+                    <a:lstStyle/>
+                    <a:p>
+                      <a:r>
+                        <a:rPr lang="en-US" dirty="0" smtClean="0"/>
+                        <a:t>8402</a:t>
+                      </a:r>
+                      <a:endParaRPr lang="en-US" dirty="0"/>
+                    </a:p>
+                  </a:txBody>
+                  <a:tcPr/>
+                </a:tc>
+              </a:tr>
+              <a:tr h="241852">
+                <a:tc>
+                  <a:txBody>
+                    <a:bodyPr/>
+                    <a:lstStyle/>
+                    <a:p>
+                      <a:r>
+                        <a:rPr lang="en-US" dirty="0" smtClean="0"/>
+                        <a:t>&lt;0.01</a:t>
+                      </a:r>
+                      <a:endParaRPr lang="en-US" dirty="0"/>
+                    </a:p>
+                  </a:txBody>
+                  <a:tcPr/>
+                </a:tc>
+                <a:tc>
+                  <a:txBody>
+                    <a:bodyPr/>
+                    <a:lstStyle/>
+                    <a:p>
+                      <a:r>
+                        <a:rPr lang="en-US" dirty="0" smtClean="0"/>
+                        <a:t>966</a:t>
+                      </a:r>
+                      <a:endParaRPr lang="en-US" dirty="0"/>
+                    </a:p>
+                  </a:txBody>
+                  <a:tcPr/>
+                </a:tc>
+                <a:tc>
+                  <a:txBody>
+                    <a:bodyPr/>
+                    <a:lstStyle/>
+                    <a:p>
+                      <a:r>
+                        <a:rPr lang="en-US" dirty="0" smtClean="0"/>
+                        <a:t>5628</a:t>
+                      </a:r>
+                      <a:endParaRPr lang="en-US" dirty="0"/>
+                    </a:p>
+                  </a:txBody>
+                  <a:tcPr/>
+                </a:tc>
+                <a:tc>
+                  <a:txBody>
+                    <a:bodyPr/>
+                    <a:lstStyle/>
+                    <a:p>
+                      <a:r>
+                        <a:rPr lang="en-US" dirty="0" smtClean="0"/>
+                        <a:t>6594</a:t>
+                      </a:r>
+                      <a:endParaRPr lang="en-US" dirty="0"/>
+                    </a:p>
+                  </a:txBody>
+                  <a:tcPr/>
+                </a:tc>
+              </a:tr>
+              <a:tr h="241852">
+                <a:tc>
+                  <a:txBody>
+                    <a:bodyPr/>
+                    <a:lstStyle/>
+                    <a:p>
+                      <a:r>
+                        <a:rPr lang="en-US" dirty="0" smtClean="0"/>
+                        <a:t>total</a:t>
+                      </a:r>
+                      <a:endParaRPr lang="en-US" dirty="0"/>
+                    </a:p>
+                  </a:txBody>
+                  <a:tcPr/>
+                </a:tc>
+                <a:tc>
+                  <a:txBody>
+                    <a:bodyPr/>
+                    <a:lstStyle/>
+                    <a:p>
+                      <a:r>
+                        <a:rPr lang="en-US" dirty="0" smtClean="0"/>
+                        <a:t>7248</a:t>
+                      </a:r>
+                      <a:endParaRPr lang="en-US" dirty="0"/>
+                    </a:p>
+                  </a:txBody>
+                  <a:tcPr/>
+                </a:tc>
+                <a:tc>
+                  <a:txBody>
+                    <a:bodyPr/>
+                    <a:lstStyle/>
+                    <a:p>
+                      <a:r>
+                        <a:rPr lang="en-US" dirty="0" smtClean="0"/>
+                        <a:t>7748</a:t>
+                      </a:r>
+                      <a:endParaRPr lang="en-US" dirty="0"/>
+                    </a:p>
+                  </a:txBody>
+                  <a:tcPr/>
+                </a:tc>
+                <a:tc>
+                  <a:txBody>
+                    <a:bodyPr/>
+                    <a:lstStyle/>
+                    <a:p>
+                      <a:r>
+                        <a:rPr lang="en-US" dirty="0" smtClean="0"/>
+                        <a:t>14996</a:t>
+                      </a:r>
+                      <a:endParaRPr lang="en-US" dirty="0"/>
+                    </a:p>
+                  </a:txBody>
+                  <a:tcPr/>
+                </a:tc>
+              </a:tr>
+            </a:tbl>
+          </a:graphicData>
+        </a:graphic>
+      </p:graphicFrame>
+      <p:pic>
+        <p:nvPicPr>
+          <p:cNvPr id="1026" name="Picture 2" descr="C:\research\GTEx\2020_01_05\2020_01_20\compare\v7_vs_v8.png"/>
+          <p:cNvPicPr>
+            <a:picLocks noChangeAspect="1" noChangeArrowheads="1"/>
+          </p:cNvPicPr>
+          <p:nvPr/>
+        </p:nvPicPr>
+        <p:blipFill>
+          <a:blip r:embed="rId2" cstate="print">
+            <a:extLst>
+              <a:ext uri="{28A0092B-C50C-407E-A947-70E740481C1C}">
+                <a14:useLocalDpi xmlns:a14="http://schemas.microsoft.com/office/drawing/2010/main" val="0"/>
+              </a:ext>
+            </a:extLst>
+          </a:blip>
+          <a:srcRect/>
+          <a:stretch>
+            <a:fillRect/>
+          </a:stretch>
+        </p:blipFill>
+        <p:spPr bwMode="auto">
+          <a:xfrm>
+            <a:off x="-8" y="1600200"/>
+            <a:ext cx="9144008" cy="3048003"/>
+          </a:xfrm>
+          <a:prstGeom prst="rect">
+            <a:avLst/>
+          </a:prstGeom>
+          <a:noFill/>
+          <a:extLst>
+            <a:ext uri="{909E8E84-426E-40DD-AFC4-6F175D3DCCD1}">
+              <a14:hiddenFill xmlns:a14="http://schemas.microsoft.com/office/drawing/2010/main">
+                <a:solidFill>
+                  <a:srgbClr val="FFFFFF"/>
+                </a:solidFill>
+              </a14:hiddenFill>
+            </a:ext>
+          </a:extLst>
+        </p:spPr>
+      </p:pic>
+    </p:spTree>
+    <p:extLst>
+      <p:ext uri="{BB962C8B-B14F-4D97-AF65-F5344CB8AC3E}">
+        <p14:creationId xmlns:p14="http://schemas.microsoft.com/office/powerpoint/2010/main" val="2050862532"/>
+      </p:ext>
+    </p:extLst>
+  </p:cSld>
+  <p:clrMapOvr>
+    <a:masterClrMapping/>
+  </p:clrMapOvr>
+</p:sld>
+</file>
+
+<file path=ppt/slides/slide11.xml><?xml version="1.0" encoding="utf-8"?>
+<p:sld xmlns:a="http://schemas.openxmlformats.org/drawingml/2006/main" xmlns:r="http://schemas.openxmlformats.org/officeDocument/2006/relationships" xmlns:p="http://schemas.openxmlformats.org/presentationml/2006/main">
+  <p:cSld>
+    <p:spTree>
+      <p:nvGrpSpPr>
+        <p:cNvPr id="1" name=""/>
+        <p:cNvGrpSpPr/>
+        <p:nvPr/>
+      </p:nvGrpSpPr>
+      <p:grpSpPr>
+        <a:xfrm>
+          <a:off x="0" y="0"/>
+          <a:ext cx="0" cy="0"/>
+          <a:chOff x="0" y="0"/>
+          <a:chExt cx="0" cy="0"/>
+        </a:xfrm>
+      </p:grpSpPr>
+      <p:sp>
+        <p:nvSpPr>
+          <p:cNvPr id="2" name="Title 1"/>
+          <p:cNvSpPr>
+            <a:spLocks noGrp="1"/>
+          </p:cNvSpPr>
+          <p:nvPr>
+            <p:ph type="title"/>
+          </p:nvPr>
+        </p:nvSpPr>
+        <p:spPr/>
+        <p:txBody>
+          <a:bodyPr/>
+          <a:lstStyle/>
+          <a:p>
+            <a:r>
+              <a:rPr lang="en-US" dirty="0" smtClean="0"/>
+              <a:t>Looking into the counts</a:t>
+            </a:r>
+            <a:endParaRPr lang="en-US" dirty="0"/>
+          </a:p>
+        </p:txBody>
+      </p:sp>
+      <p:sp>
+        <p:nvSpPr>
+          <p:cNvPr id="3" name="Content Placeholder 2"/>
+          <p:cNvSpPr>
+            <a:spLocks noGrp="1"/>
+          </p:cNvSpPr>
+          <p:nvPr>
+            <p:ph idx="1"/>
+          </p:nvPr>
+        </p:nvSpPr>
+        <p:spPr>
+          <a:xfrm>
+            <a:off x="228600" y="1524000"/>
+            <a:ext cx="8915400" cy="4525963"/>
+          </a:xfrm>
+        </p:spPr>
+        <p:txBody>
+          <a:bodyPr>
+            <a:normAutofit/>
+          </a:bodyPr>
+          <a:lstStyle/>
+          <a:p>
+            <a:r>
+              <a:rPr lang="en-US" sz="2400" dirty="0" smtClean="0"/>
+              <a:t>YEC3 - In v7 this sample was removed as an outlier</a:t>
+            </a:r>
+            <a:r>
+              <a:rPr lang="en-US" sz="2400" dirty="0"/>
+              <a:t> </a:t>
+            </a:r>
+            <a:r>
+              <a:rPr lang="en-US" sz="2400" dirty="0" smtClean="0"/>
+              <a:t>(it does look odd based on </a:t>
+            </a:r>
+            <a:r>
+              <a:rPr lang="en-US" sz="2400" dirty="0" err="1"/>
+              <a:t>TReC</a:t>
+            </a:r>
+            <a:r>
+              <a:rPr lang="en-US" sz="2400" dirty="0"/>
+              <a:t> and </a:t>
+            </a:r>
+            <a:r>
+              <a:rPr lang="en-US" sz="2400" dirty="0" err="1" smtClean="0"/>
+              <a:t>ASE.frac</a:t>
+            </a:r>
+            <a:r>
+              <a:rPr lang="en-US" sz="2400" dirty="0" smtClean="0"/>
+              <a:t>) page 56</a:t>
+            </a:r>
+          </a:p>
+          <a:p>
+            <a:r>
+              <a:rPr lang="en-US" sz="2400" dirty="0"/>
+              <a:t>Similar sample: </a:t>
+            </a:r>
+            <a:r>
+              <a:rPr lang="en-US" sz="2400" dirty="0" smtClean="0"/>
+              <a:t>14ABY (by </a:t>
+            </a:r>
+            <a:r>
+              <a:rPr lang="en-US" sz="2400" dirty="0" err="1"/>
+              <a:t>TReC</a:t>
+            </a:r>
+            <a:r>
+              <a:rPr lang="en-US" sz="2400" dirty="0"/>
+              <a:t> and </a:t>
+            </a:r>
+            <a:r>
+              <a:rPr lang="en-US" sz="2400" dirty="0" err="1"/>
+              <a:t>ASE.frac</a:t>
+            </a:r>
+            <a:r>
+              <a:rPr lang="en-US" sz="2400" dirty="0"/>
+              <a:t> </a:t>
+            </a:r>
+            <a:r>
+              <a:rPr lang="en-US" sz="2400" dirty="0" smtClean="0"/>
+              <a:t>) page </a:t>
+            </a:r>
+            <a:r>
+              <a:rPr lang="en-US" sz="2400" dirty="0"/>
+              <a:t>115</a:t>
+            </a:r>
+          </a:p>
+          <a:p>
+            <a:endParaRPr lang="en-US" sz="2400" dirty="0" smtClean="0"/>
+          </a:p>
+          <a:p>
+            <a:r>
+              <a:rPr lang="en-US" sz="2400" dirty="0" smtClean="0"/>
+              <a:t>11 more samples with non-similar hap1</a:t>
+            </a:r>
+          </a:p>
+          <a:p>
+            <a:r>
+              <a:rPr lang="en-US" sz="2400" dirty="0" smtClean="0"/>
+              <a:t>XXEK (</a:t>
+            </a:r>
+            <a:r>
+              <a:rPr lang="en-US" sz="2400" dirty="0" err="1" smtClean="0"/>
+              <a:t>pg</a:t>
+            </a:r>
+            <a:r>
+              <a:rPr lang="en-US" sz="2400" dirty="0" smtClean="0"/>
+              <a:t> 324), XXEK (</a:t>
+            </a:r>
+            <a:r>
+              <a:rPr lang="en-US" sz="2400" dirty="0" err="1" smtClean="0"/>
+              <a:t>pg</a:t>
+            </a:r>
+            <a:r>
+              <a:rPr lang="en-US" sz="2400" dirty="0" smtClean="0"/>
+              <a:t> 325), PLZ5 (</a:t>
+            </a:r>
+            <a:r>
+              <a:rPr lang="en-US" sz="2400" dirty="0" err="1" smtClean="0"/>
+              <a:t>pg</a:t>
+            </a:r>
+            <a:r>
+              <a:rPr lang="en-US" sz="2400" dirty="0" smtClean="0"/>
+              <a:t> 335), PWN1 (</a:t>
+            </a:r>
+            <a:r>
+              <a:rPr lang="en-US" sz="2400" dirty="0" err="1" smtClean="0"/>
+              <a:t>pg</a:t>
+            </a:r>
+            <a:r>
+              <a:rPr lang="en-US" sz="2400" dirty="0" smtClean="0"/>
+              <a:t> 336), PLZ4 (</a:t>
+            </a:r>
+            <a:r>
+              <a:rPr lang="en-US" sz="2400" dirty="0" err="1" smtClean="0"/>
+              <a:t>pg</a:t>
+            </a:r>
+            <a:r>
+              <a:rPr lang="en-US" sz="2400" dirty="0" smtClean="0"/>
+              <a:t> 337), QCQG (</a:t>
+            </a:r>
+            <a:r>
+              <a:rPr lang="en-US" sz="2400" dirty="0" err="1" smtClean="0"/>
+              <a:t>pg</a:t>
+            </a:r>
+            <a:r>
+              <a:rPr lang="en-US" sz="2400" dirty="0" smtClean="0"/>
+              <a:t> 338), QDT8 (</a:t>
+            </a:r>
+            <a:r>
+              <a:rPr lang="en-US" sz="2400" dirty="0" err="1" smtClean="0"/>
+              <a:t>pg</a:t>
+            </a:r>
+            <a:r>
+              <a:rPr lang="en-US" sz="2400" dirty="0" smtClean="0"/>
+              <a:t> 341), S32W (</a:t>
+            </a:r>
+            <a:r>
+              <a:rPr lang="en-US" sz="2400" dirty="0" err="1" smtClean="0"/>
+              <a:t>pg</a:t>
+            </a:r>
+            <a:r>
+              <a:rPr lang="en-US" sz="2400" dirty="0" smtClean="0"/>
+              <a:t> 342), PWCY (</a:t>
+            </a:r>
+            <a:r>
+              <a:rPr lang="en-US" sz="2400" dirty="0" err="1" smtClean="0"/>
+              <a:t>pg</a:t>
+            </a:r>
+            <a:r>
+              <a:rPr lang="en-US" sz="2400" dirty="0" smtClean="0"/>
+              <a:t> 343), T6MN (</a:t>
+            </a:r>
+            <a:r>
+              <a:rPr lang="en-US" sz="2400" dirty="0" err="1" smtClean="0"/>
+              <a:t>pg</a:t>
+            </a:r>
+            <a:r>
+              <a:rPr lang="en-US" sz="2400" dirty="0" smtClean="0"/>
+              <a:t> 344) WFON (</a:t>
+            </a:r>
+            <a:r>
+              <a:rPr lang="en-US" sz="2400" dirty="0" err="1" smtClean="0"/>
+              <a:t>pg</a:t>
+            </a:r>
+            <a:r>
+              <a:rPr lang="en-US" sz="2400" dirty="0" smtClean="0"/>
+              <a:t> 346)</a:t>
+            </a:r>
+            <a:endParaRPr lang="en-US" sz="2400" dirty="0"/>
+          </a:p>
+          <a:p>
+            <a:endParaRPr lang="en-US" sz="2400" dirty="0"/>
+          </a:p>
+        </p:txBody>
+      </p:sp>
+    </p:spTree>
+    <p:extLst>
+      <p:ext uri="{BB962C8B-B14F-4D97-AF65-F5344CB8AC3E}">
+        <p14:creationId xmlns:p14="http://schemas.microsoft.com/office/powerpoint/2010/main" val="291859725"/>
+      </p:ext>
+    </p:extLst>
+  </p:cSld>
+  <p:clrMapOvr>
+    <a:masterClrMapping/>
+  </p:clrMapOvr>
+</p:sld>
+</file>
+
+<file path=ppt/slides/slide12.xml><?xml version="1.0" encoding="utf-8"?>
+<p:sld xmlns:a="http://schemas.openxmlformats.org/drawingml/2006/main" xmlns:r="http://schemas.openxmlformats.org/officeDocument/2006/relationships" xmlns:p="http://schemas.openxmlformats.org/presentationml/2006/main">
+  <p:cSld>
+    <p:spTree>
+      <p:nvGrpSpPr>
+        <p:cNvPr id="1" name=""/>
+        <p:cNvGrpSpPr/>
+        <p:nvPr/>
+      </p:nvGrpSpPr>
+      <p:grpSpPr>
+        <a:xfrm>
+          <a:off x="0" y="0"/>
+          <a:ext cx="0" cy="0"/>
+          <a:chOff x="0" y="0"/>
+          <a:chExt cx="0" cy="0"/>
+        </a:xfrm>
+      </p:grpSpPr>
+      <p:sp>
+        <p:nvSpPr>
+          <p:cNvPr id="2" name="Title 1"/>
+          <p:cNvSpPr>
+            <a:spLocks noGrp="1"/>
+          </p:cNvSpPr>
+          <p:nvPr>
+            <p:ph type="title"/>
+          </p:nvPr>
+        </p:nvSpPr>
+        <p:spPr/>
+        <p:txBody>
+          <a:bodyPr>
+            <a:normAutofit fontScale="90000"/>
+          </a:bodyPr>
+          <a:lstStyle/>
+          <a:p>
+            <a:r>
+              <a:rPr lang="en-US" dirty="0" smtClean="0"/>
+              <a:t>Genes not present, but those that should be in </a:t>
+            </a:r>
+            <a:r>
+              <a:rPr lang="en-US" dirty="0" err="1" smtClean="0"/>
+              <a:t>gencode</a:t>
+            </a:r>
+            <a:r>
+              <a:rPr lang="en-US" dirty="0" smtClean="0"/>
+              <a:t> 26</a:t>
+            </a:r>
+            <a:endParaRPr lang="en-US" dirty="0"/>
+          </a:p>
+        </p:txBody>
+      </p:sp>
+      <p:sp>
+        <p:nvSpPr>
+          <p:cNvPr id="3" name="Content Placeholder 2"/>
+          <p:cNvSpPr>
+            <a:spLocks noGrp="1"/>
+          </p:cNvSpPr>
+          <p:nvPr>
+            <p:ph idx="1"/>
+          </p:nvPr>
+        </p:nvSpPr>
+        <p:spPr/>
+        <p:txBody>
+          <a:bodyPr>
+            <a:normAutofit lnSpcReduction="10000"/>
+          </a:bodyPr>
+          <a:lstStyle/>
+          <a:p>
+            <a:r>
+              <a:rPr lang="en-US" dirty="0" smtClean="0"/>
+              <a:t>Note, </a:t>
+            </a:r>
+            <a:r>
+              <a:rPr lang="en-US" dirty="0"/>
+              <a:t>there were </a:t>
+            </a:r>
+            <a:r>
+              <a:rPr lang="en-US" dirty="0" smtClean="0"/>
+              <a:t>538 genes that were in v7 dataset I’ve got, but not in v8.</a:t>
+            </a:r>
+          </a:p>
+          <a:p>
+            <a:r>
+              <a:rPr lang="en-US" dirty="0" smtClean="0"/>
+              <a:t>I recently double-checked, among those 538, 236 were present in </a:t>
+            </a:r>
+            <a:r>
+              <a:rPr lang="en-US" dirty="0" err="1" smtClean="0"/>
+              <a:t>gencode</a:t>
+            </a:r>
+            <a:r>
+              <a:rPr lang="en-US" dirty="0" smtClean="0"/>
+              <a:t> v26 annotation I downloaded from this website:</a:t>
+            </a:r>
+          </a:p>
+          <a:p>
+            <a:r>
+              <a:rPr lang="en-US" dirty="0">
+                <a:hlinkClick r:id="rId2"/>
+              </a:rPr>
+              <a:t>https://</a:t>
+            </a:r>
+            <a:r>
+              <a:rPr lang="en-US" dirty="0" smtClean="0">
+                <a:hlinkClick r:id="rId2"/>
+              </a:rPr>
+              <a:t>www.gencodegenes.org/human/release_26.html</a:t>
+            </a:r>
+            <a:endParaRPr lang="en-US" dirty="0" smtClean="0"/>
+          </a:p>
+          <a:p>
+            <a:r>
+              <a:rPr lang="en-US" dirty="0" smtClean="0"/>
+              <a:t>Should we double-check which </a:t>
+            </a:r>
+            <a:r>
+              <a:rPr lang="en-US" dirty="0" err="1" smtClean="0"/>
+              <a:t>gencode</a:t>
+            </a:r>
+            <a:r>
+              <a:rPr lang="en-US" dirty="0" smtClean="0"/>
+              <a:t> file was used to produce gene-level counts?</a:t>
+            </a:r>
+            <a:endParaRPr lang="en-US" dirty="0"/>
+          </a:p>
+        </p:txBody>
+      </p:sp>
+    </p:spTree>
+    <p:extLst>
+      <p:ext uri="{BB962C8B-B14F-4D97-AF65-F5344CB8AC3E}">
+        <p14:creationId xmlns:p14="http://schemas.microsoft.com/office/powerpoint/2010/main" val="1346942050"/>
+      </p:ext>
+    </p:extLst>
+  </p:cSld>
+  <p:clrMapOvr>
+    <a:masterClrMapping/>
+  </p:clrMapOvr>
+</p:sld>
+</file>
+
 <file path=ppt/slides/slide2.xml><?xml version="1.0" encoding="utf-8"?>
 <p:sld xmlns:a="http://schemas.openxmlformats.org/drawingml/2006/main" xmlns:r="http://schemas.openxmlformats.org/officeDocument/2006/relationships" xmlns:p="http://schemas.openxmlformats.org/presentationml/2006/main">
   <p:cSld>
@@ -4799,11 +5581,7 @@
                     <a:p>
                       <a:r>
                         <a:rPr lang="en-US" dirty="0" smtClean="0"/>
-                        <a:t>2 </a:t>
-                      </a:r>
-                      <a:r>
-                        <a:rPr lang="en-US" dirty="0" smtClean="0"/>
-                        <a:t>(6)</a:t>
+                        <a:t>2 (6)</a:t>
                       </a:r>
                       <a:endParaRPr lang="en-US" dirty="0"/>
                     </a:p>
@@ -4903,11 +5681,7 @@
                     <a:p>
                       <a:r>
                         <a:rPr lang="en-US" dirty="0" smtClean="0"/>
-                        <a:t>4 </a:t>
-                      </a:r>
-                      <a:r>
-                        <a:rPr lang="en-US" dirty="0" smtClean="0"/>
-                        <a:t>(12)</a:t>
+                        <a:t>4 (12)</a:t>
                       </a:r>
                       <a:endParaRPr lang="en-US" dirty="0"/>
                     </a:p>
@@ -4951,11 +5725,7 @@
                     <a:p>
                       <a:r>
                         <a:rPr lang="en-US" dirty="0" smtClean="0"/>
-                        <a:t>0 </a:t>
-                      </a:r>
-                      <a:r>
-                        <a:rPr lang="en-US" dirty="0" smtClean="0"/>
-                        <a:t>(0)</a:t>
+                        <a:t>0 (0)</a:t>
                       </a:r>
                       <a:endParaRPr lang="en-US" dirty="0"/>
                     </a:p>
@@ -5055,11 +5825,7 @@
                     <a:p>
                       <a:r>
                         <a:rPr lang="en-US" dirty="0" smtClean="0"/>
-                        <a:t>0 </a:t>
-                      </a:r>
-                      <a:r>
-                        <a:rPr lang="en-US" dirty="0" smtClean="0"/>
-                        <a:t>(0)</a:t>
+                        <a:t>0 (0)</a:t>
                       </a:r>
                       <a:endParaRPr lang="en-US" dirty="0"/>
                     </a:p>
@@ -5109,11 +5875,7 @@
                     <a:p>
                       <a:r>
                         <a:rPr lang="en-US" dirty="0" smtClean="0"/>
-                        <a:t>2 </a:t>
-                      </a:r>
-                      <a:r>
-                        <a:rPr lang="en-US" dirty="0" smtClean="0"/>
-                        <a:t>(3)</a:t>
+                        <a:t>2 (3)</a:t>
                       </a:r>
                       <a:endParaRPr lang="en-US" dirty="0"/>
                     </a:p>
@@ -5197,11 +5959,7 @@
                     <a:p>
                       <a:r>
                         <a:rPr lang="en-US" dirty="0" smtClean="0"/>
-                        <a:t>0 </a:t>
-                      </a:r>
-                      <a:r>
-                        <a:rPr lang="en-US" dirty="0" smtClean="0"/>
-                        <a:t>(7)</a:t>
+                        <a:t>0 (7)</a:t>
                       </a:r>
                       <a:endParaRPr lang="en-US" dirty="0"/>
                     </a:p>
@@ -5672,11 +6430,7 @@
                     <a:p>
                       <a:r>
                         <a:rPr lang="en-US" dirty="0" smtClean="0"/>
-                        <a:t>1 </a:t>
-                      </a:r>
-                      <a:r>
-                        <a:rPr lang="en-US" dirty="0" smtClean="0"/>
-                        <a:t>(6)</a:t>
+                        <a:t>1 (6)</a:t>
                       </a:r>
                       <a:endParaRPr lang="en-US" dirty="0"/>
                     </a:p>
@@ -5756,11 +6510,7 @@
                     <a:p>
                       <a:r>
                         <a:rPr lang="en-US" dirty="0" smtClean="0"/>
-                        <a:t>16 (</a:t>
-                      </a:r>
-                      <a:r>
-                        <a:rPr lang="en-US" dirty="0" smtClean="0"/>
-                        <a:t>55)</a:t>
+                        <a:t>16 (55)</a:t>
                       </a:r>
                       <a:endParaRPr lang="en-US" dirty="0"/>
                     </a:p>
@@ -5968,11 +6718,7 @@
                     <a:p>
                       <a:r>
                         <a:rPr lang="en-US" dirty="0" smtClean="0"/>
-                        <a:t>1 </a:t>
-                      </a:r>
-                      <a:r>
-                        <a:rPr lang="en-US" dirty="0" smtClean="0"/>
-                        <a:t>(2)</a:t>
+                        <a:t>1 (2)</a:t>
                       </a:r>
                       <a:endParaRPr lang="en-US" dirty="0"/>
                     </a:p>
@@ -6000,29 +6746,21 @@
                     <a:p>
                       <a:r>
                         <a:rPr lang="en-US" dirty="0" smtClean="0"/>
-                        <a:t>0 </a:t>
-                      </a:r>
-                      <a:r>
-                        <a:rPr lang="en-US" dirty="0" smtClean="0"/>
-                        <a:t>(1)</a:t>
-                      </a:r>
-                      <a:endParaRPr lang="en-US" dirty="0"/>
-                    </a:p>
-                  </a:txBody>
-                  <a:tcPr/>
-                </a:tc>
-                <a:tc>
-                  <a:txBody>
-                    <a:bodyPr/>
-                    <a:lstStyle/>
-                    <a:p>
-                      <a:r>
-                        <a:rPr lang="en-US" dirty="0" smtClean="0"/>
-                        <a:t>2 </a:t>
-                      </a:r>
-                      <a:r>
-                        <a:rPr lang="en-US" dirty="0" smtClean="0"/>
-                        <a:t>(6)</a:t>
+                        <a:t>0 (1)</a:t>
+                      </a:r>
+                      <a:endParaRPr lang="en-US" dirty="0"/>
+                    </a:p>
+                  </a:txBody>
+                  <a:tcPr/>
+                </a:tc>
+                <a:tc>
+                  <a:txBody>
+                    <a:bodyPr/>
+                    <a:lstStyle/>
+                    <a:p>
+                      <a:r>
+                        <a:rPr lang="en-US" dirty="0" smtClean="0"/>
+                        <a:t>2 (6)</a:t>
                       </a:r>
                       <a:endParaRPr lang="en-US" dirty="0"/>
                     </a:p>
@@ -6092,11 +6830,7 @@
                     <a:p>
                       <a:r>
                         <a:rPr lang="en-US" dirty="0" smtClean="0"/>
-                        <a:t>1 </a:t>
-                      </a:r>
-                      <a:r>
-                        <a:rPr lang="en-US" dirty="0" smtClean="0"/>
-                        <a:t>(1)</a:t>
+                        <a:t>1 (1)</a:t>
                       </a:r>
                       <a:endParaRPr lang="en-US" dirty="0"/>
                     </a:p>
@@ -6243,11 +6977,7 @@
           <a:p>
             <a:r>
               <a:rPr lang="en-US" dirty="0" smtClean="0"/>
-              <a:t>Overall results for </a:t>
-            </a:r>
-            <a:r>
-              <a:rPr lang="en-US" dirty="0" smtClean="0"/>
-              <a:t>CTCF</a:t>
+              <a:t>Overall results for CTCF</a:t>
             </a:r>
             <a:endParaRPr lang="en-US" dirty="0"/>
           </a:p>
@@ -6547,11 +7277,7 @@
                     <a:p>
                       <a:r>
                         <a:rPr lang="en-US" dirty="0" smtClean="0"/>
-                        <a:t>4 (26</a:t>
-                      </a:r>
-                      <a:r>
-                        <a:rPr lang="en-US" dirty="0" smtClean="0"/>
-                        <a:t>)</a:t>
+                        <a:t>4 (26)</a:t>
                       </a:r>
                       <a:endParaRPr lang="en-US" dirty="0"/>
                     </a:p>
@@ -6579,11 +7305,7 @@
                     <a:p>
                       <a:r>
                         <a:rPr lang="en-US" dirty="0" smtClean="0"/>
-                        <a:t>1 </a:t>
-                      </a:r>
-                      <a:r>
-                        <a:rPr lang="en-US" dirty="0" smtClean="0"/>
-                        <a:t>(4)</a:t>
+                        <a:t>1 (4)</a:t>
                       </a:r>
                       <a:endParaRPr lang="en-US" dirty="0"/>
                     </a:p>
@@ -6615,11 +7337,7 @@
                     <a:p>
                       <a:r>
                         <a:rPr lang="en-US" dirty="0" smtClean="0"/>
-                        <a:t>1 </a:t>
-                      </a:r>
-                      <a:r>
-                        <a:rPr lang="en-US" dirty="0" smtClean="0"/>
-                        <a:t>(3)</a:t>
+                        <a:t>1 (3)</a:t>
                       </a:r>
                       <a:endParaRPr lang="en-US" dirty="0"/>
                     </a:p>
@@ -6691,11 +7409,7 @@
                     <a:p>
                       <a:r>
                         <a:rPr lang="en-US" dirty="0" smtClean="0"/>
-                        <a:t>6 </a:t>
-                      </a:r>
-                      <a:r>
-                        <a:rPr lang="en-US" dirty="0" smtClean="0"/>
-                        <a:t>(17)</a:t>
+                        <a:t>6 (17)</a:t>
                       </a:r>
                       <a:endParaRPr lang="en-US" dirty="0"/>
                     </a:p>
@@ -6825,11 +7539,7 @@
                     <a:p>
                       <a:r>
                         <a:rPr lang="en-US" dirty="0" smtClean="0"/>
-                        <a:t>10 (55</a:t>
-                      </a:r>
-                      <a:r>
-                        <a:rPr lang="en-US" dirty="0" smtClean="0"/>
-                        <a:t>)</a:t>
+                        <a:t>10 (55)</a:t>
                       </a:r>
                       <a:endParaRPr lang="en-US" dirty="0"/>
                     </a:p>
@@ -6887,60 +7597,6 @@
                     <a:p>
                       <a:r>
                         <a:rPr lang="en-US" dirty="0" smtClean="0"/>
-                        <a:t>1 </a:t>
-                      </a:r>
-                      <a:r>
-                        <a:rPr lang="en-US" dirty="0" smtClean="0"/>
-                        <a:t>(4)</a:t>
-                      </a:r>
-                      <a:endParaRPr lang="en-US" dirty="0"/>
-                    </a:p>
-                  </a:txBody>
-                  <a:tcPr/>
-                </a:tc>
-                <a:tc>
-                  <a:txBody>
-                    <a:bodyPr/>
-                    <a:lstStyle/>
-                    <a:p>
-                      <a:r>
-                        <a:rPr lang="en-US" dirty="0" smtClean="0"/>
-                        <a:t>0 </a:t>
-                      </a:r>
-                      <a:r>
-                        <a:rPr lang="en-US" dirty="0" smtClean="0"/>
-                        <a:t>(0)</a:t>
-                      </a:r>
-                      <a:endParaRPr lang="en-US" dirty="0"/>
-                    </a:p>
-                  </a:txBody>
-                  <a:tcPr/>
-                </a:tc>
-                <a:tc>
-                  <a:txBody>
-                    <a:bodyPr/>
-                    <a:lstStyle/>
-                    <a:p>
-                      <a:r>
-                        <a:rPr lang="en-US" dirty="0" smtClean="0"/>
-                        <a:t>0 </a:t>
-                      </a:r>
-                      <a:r>
-                        <a:rPr lang="en-US" dirty="0" smtClean="0"/>
-                        <a:t>(0)</a:t>
-                      </a:r>
-                      <a:endParaRPr lang="en-US" dirty="0"/>
-                    </a:p>
-                  </a:txBody>
-                  <a:tcPr/>
-                </a:tc>
-                <a:tc>
-                  <a:txBody>
-                    <a:bodyPr/>
-                    <a:lstStyle/>
-                    <a:p>
-                      <a:r>
-                        <a:rPr lang="en-US" dirty="0" smtClean="0"/>
                         <a:t>1 (4)</a:t>
                       </a:r>
                       <a:endParaRPr lang="en-US" dirty="0"/>
@@ -6955,11 +7611,49 @@
                     <a:p>
                       <a:r>
                         <a:rPr lang="en-US" dirty="0" smtClean="0"/>
-                        <a:t>0 </a:t>
-                      </a:r>
-                      <a:r>
-                        <a:rPr lang="en-US" dirty="0" smtClean="0"/>
-                        <a:t>(0)</a:t>
+                        <a:t>0 (0)</a:t>
+                      </a:r>
+                      <a:endParaRPr lang="en-US" dirty="0"/>
+                    </a:p>
+                  </a:txBody>
+                  <a:tcPr/>
+                </a:tc>
+                <a:tc>
+                  <a:txBody>
+                    <a:bodyPr/>
+                    <a:lstStyle/>
+                    <a:p>
+                      <a:r>
+                        <a:rPr lang="en-US" dirty="0" smtClean="0"/>
+                        <a:t>0 (0)</a:t>
+                      </a:r>
+                      <a:endParaRPr lang="en-US" dirty="0"/>
+                    </a:p>
+                  </a:txBody>
+                  <a:tcPr/>
+                </a:tc>
+                <a:tc>
+                  <a:txBody>
+                    <a:bodyPr/>
+                    <a:lstStyle/>
+                    <a:p>
+                      <a:r>
+                        <a:rPr lang="en-US" dirty="0" smtClean="0"/>
+                        <a:t>1 (4)</a:t>
+                      </a:r>
+                      <a:endParaRPr lang="en-US" dirty="0"/>
+                    </a:p>
+                  </a:txBody>
+                  <a:tcPr/>
+                </a:tc>
+                <a:tc>
+                  <a:txBody>
+                    <a:bodyPr/>
+                    <a:lstStyle/>
+                    <a:p>
+                      <a:r>
+                        <a:rPr lang="en-US" dirty="0" smtClean="0"/>
+                        <a:t>0 (0)</a:t>
                       </a:r>
                       <a:endParaRPr lang="en-US" dirty="0"/>
                     </a:p>
@@ -7119,6 +7813,719 @@
     <p:extLst>
       <p:ext uri="{BB962C8B-B14F-4D97-AF65-F5344CB8AC3E}">
         <p14:creationId xmlns:p14="http://schemas.microsoft.com/office/powerpoint/2010/main" val="4292840470"/>
+      </p:ext>
+    </p:extLst>
+  </p:cSld>
+  <p:clrMapOvr>
+    <a:masterClrMapping/>
+  </p:clrMapOvr>
+</p:sld>
+</file>
+
+<file path=ppt/slides/slide9.xml><?xml version="1.0" encoding="utf-8"?>
+<p:sld xmlns:a="http://schemas.openxmlformats.org/drawingml/2006/main" xmlns:r="http://schemas.openxmlformats.org/officeDocument/2006/relationships" xmlns:p="http://schemas.openxmlformats.org/presentationml/2006/main">
+  <p:cSld>
+    <p:spTree>
+      <p:nvGrpSpPr>
+        <p:cNvPr id="1" name=""/>
+        <p:cNvGrpSpPr/>
+        <p:nvPr/>
+      </p:nvGrpSpPr>
+      <p:grpSpPr>
+        <a:xfrm>
+          <a:off x="0" y="0"/>
+          <a:ext cx="0" cy="0"/>
+          <a:chOff x="0" y="0"/>
+          <a:chExt cx="0" cy="0"/>
+        </a:xfrm>
+      </p:grpSpPr>
+      <p:sp>
+        <p:nvSpPr>
+          <p:cNvPr id="2" name="Title 1"/>
+          <p:cNvSpPr>
+            <a:spLocks noGrp="1"/>
+          </p:cNvSpPr>
+          <p:nvPr>
+            <p:ph type="title"/>
+          </p:nvPr>
+        </p:nvSpPr>
+        <p:spPr/>
+        <p:txBody>
+          <a:bodyPr/>
+          <a:lstStyle/>
+          <a:p>
+            <a:r>
+              <a:rPr lang="en-US" dirty="0" smtClean="0"/>
+              <a:t>Whole Blood</a:t>
+            </a:r>
+            <a:endParaRPr lang="en-US" dirty="0"/>
+          </a:p>
+        </p:txBody>
+      </p:sp>
+      <p:graphicFrame>
+        <p:nvGraphicFramePr>
+          <p:cNvPr id="4" name="Content Placeholder 3"/>
+          <p:cNvGraphicFramePr>
+            <a:graphicFrameLocks noGrp="1"/>
+          </p:cNvGraphicFramePr>
+          <p:nvPr>
+            <p:ph idx="1"/>
+            <p:extLst>
+              <p:ext uri="{D42A27DB-BD31-4B8C-83A1-F6EECF244321}">
+                <p14:modId xmlns:p14="http://schemas.microsoft.com/office/powerpoint/2010/main" val="2439265181"/>
+              </p:ext>
+            </p:extLst>
+          </p:nvPr>
+        </p:nvGraphicFramePr>
+        <p:xfrm>
+          <a:off x="457200" y="1600200"/>
+          <a:ext cx="8229599" cy="2123440"/>
+        </p:xfrm>
+        <a:graphic>
+          <a:graphicData uri="http://schemas.openxmlformats.org/drawingml/2006/table">
+            <a:tbl>
+              <a:tblPr firstRow="1" bandRow="1">
+                <a:tableStyleId>{5C22544A-7EE6-4342-B048-85BDC9FD1C3A}</a:tableStyleId>
+              </a:tblPr>
+              <a:tblGrid>
+                <a:gridCol w="1600200"/>
+                <a:gridCol w="1066800"/>
+                <a:gridCol w="1295400"/>
+                <a:gridCol w="1143000"/>
+                <a:gridCol w="838200"/>
+                <a:gridCol w="1219200"/>
+                <a:gridCol w="1066799"/>
+              </a:tblGrid>
+              <a:tr h="370840">
+                <a:tc>
+                  <a:txBody>
+                    <a:bodyPr/>
+                    <a:lstStyle/>
+                    <a:p>
+                      <a:pPr marL="0" marR="0" indent="0" algn="l" defTabSz="914400" rtl="0" eaLnBrk="1" fontAlgn="auto" latinLnBrk="0" hangingPunct="1">
+                        <a:lnSpc>
+                          <a:spcPct val="100000"/>
+                        </a:lnSpc>
+                        <a:spcBef>
+                          <a:spcPts val="0"/>
+                        </a:spcBef>
+                        <a:spcAft>
+                          <a:spcPts val="0"/>
+                        </a:spcAft>
+                        <a:buClrTx/>
+                        <a:buSzTx/>
+                        <a:buFontTx/>
+                        <a:buNone/>
+                        <a:tabLst/>
+                        <a:defRPr/>
+                      </a:pPr>
+                      <a:r>
+                        <a:rPr lang="en-US" dirty="0" smtClean="0"/>
+                        <a:t>Whole blood</a:t>
+                      </a:r>
+                    </a:p>
+                    <a:p>
+                      <a:pPr marL="0" marR="0" indent="0" algn="l" defTabSz="914400" rtl="0" eaLnBrk="1" fontAlgn="auto" latinLnBrk="0" hangingPunct="1">
+                        <a:lnSpc>
+                          <a:spcPct val="100000"/>
+                        </a:lnSpc>
+                        <a:spcBef>
+                          <a:spcPts val="0"/>
+                        </a:spcBef>
+                        <a:spcAft>
+                          <a:spcPts val="0"/>
+                        </a:spcAft>
+                        <a:buClrTx/>
+                        <a:buSzTx/>
+                        <a:buFontTx/>
+                        <a:buNone/>
+                        <a:tabLst/>
+                        <a:defRPr/>
+                      </a:pPr>
+                      <a:endParaRPr lang="en-US" dirty="0" smtClean="0"/>
+                    </a:p>
+                  </a:txBody>
+                  <a:tcPr/>
+                </a:tc>
+                <a:tc gridSpan="3">
+                  <a:txBody>
+                    <a:bodyPr/>
+                    <a:lstStyle/>
+                    <a:p>
+                      <a:r>
+                        <a:rPr lang="en-US" dirty="0" smtClean="0"/>
+                        <a:t>Long</a:t>
+                      </a:r>
+                      <a:r>
+                        <a:rPr lang="en-US" baseline="0" dirty="0" smtClean="0"/>
+                        <a:t> model</a:t>
+                      </a:r>
+                      <a:endParaRPr lang="en-US" dirty="0"/>
+                    </a:p>
+                  </a:txBody>
+                  <a:tcPr/>
+                </a:tc>
+                <a:tc hMerge="1">
+                  <a:txBody>
+                    <a:bodyPr/>
+                    <a:lstStyle/>
+                    <a:p>
+                      <a:endParaRPr lang="en-US" dirty="0"/>
+                    </a:p>
+                  </a:txBody>
+                  <a:tcPr/>
+                </a:tc>
+                <a:tc hMerge="1">
+                  <a:txBody>
+                    <a:bodyPr/>
+                    <a:lstStyle/>
+                    <a:p>
+                      <a:endParaRPr lang="en-US" dirty="0"/>
+                    </a:p>
+                  </a:txBody>
+                  <a:tcPr/>
+                </a:tc>
+                <a:tc gridSpan="3">
+                  <a:txBody>
+                    <a:bodyPr/>
+                    <a:lstStyle/>
+                    <a:p>
+                      <a:r>
+                        <a:rPr lang="en-US" dirty="0" smtClean="0"/>
+                        <a:t>Short</a:t>
+                      </a:r>
+                      <a:r>
+                        <a:rPr lang="en-US" baseline="0" dirty="0" smtClean="0"/>
+                        <a:t> model</a:t>
+                      </a:r>
+                      <a:endParaRPr lang="en-US" dirty="0"/>
+                    </a:p>
+                  </a:txBody>
+                  <a:tcPr/>
+                </a:tc>
+                <a:tc hMerge="1">
+                  <a:txBody>
+                    <a:bodyPr/>
+                    <a:lstStyle/>
+                    <a:p>
+                      <a:endParaRPr lang="en-US"/>
+                    </a:p>
+                  </a:txBody>
+                  <a:tcPr/>
+                </a:tc>
+                <a:tc hMerge="1">
+                  <a:txBody>
+                    <a:bodyPr/>
+                    <a:lstStyle/>
+                    <a:p>
+                      <a:endParaRPr lang="en-US" dirty="0"/>
+                    </a:p>
+                  </a:txBody>
+                  <a:tcPr/>
+                </a:tc>
+              </a:tr>
+              <a:tr h="370840">
+                <a:tc>
+                  <a:txBody>
+                    <a:bodyPr/>
+                    <a:lstStyle/>
+                    <a:p>
+                      <a:pPr marL="0" marR="0" indent="0" algn="l" defTabSz="914400" rtl="0" eaLnBrk="1" fontAlgn="auto" latinLnBrk="0" hangingPunct="1">
+                        <a:lnSpc>
+                          <a:spcPct val="100000"/>
+                        </a:lnSpc>
+                        <a:spcBef>
+                          <a:spcPts val="0"/>
+                        </a:spcBef>
+                        <a:spcAft>
+                          <a:spcPts val="0"/>
+                        </a:spcAft>
+                        <a:buClrTx/>
+                        <a:buSzTx/>
+                        <a:buFontTx/>
+                        <a:buNone/>
+                        <a:tabLst/>
+                        <a:defRPr/>
+                      </a:pPr>
+                      <a:r>
+                        <a:rPr lang="en-US" dirty="0" smtClean="0"/>
+                        <a:t>Fitted model</a:t>
+                      </a:r>
+                    </a:p>
+                  </a:txBody>
+                  <a:tcPr/>
+                </a:tc>
+                <a:tc>
+                  <a:txBody>
+                    <a:bodyPr/>
+                    <a:lstStyle/>
+                    <a:p>
+                      <a:r>
+                        <a:rPr lang="en-US" dirty="0" smtClean="0"/>
+                        <a:t>Sex</a:t>
+                      </a:r>
+                      <a:endParaRPr lang="en-US" dirty="0"/>
+                    </a:p>
+                  </a:txBody>
+                  <a:tcPr/>
+                </a:tc>
+                <a:tc>
+                  <a:txBody>
+                    <a:bodyPr/>
+                    <a:lstStyle/>
+                    <a:p>
+                      <a:r>
+                        <a:rPr lang="en-US" dirty="0" smtClean="0"/>
+                        <a:t>Cond</a:t>
+                      </a:r>
+                      <a:endParaRPr lang="en-US" dirty="0"/>
+                    </a:p>
+                  </a:txBody>
+                  <a:tcPr/>
+                </a:tc>
+                <a:tc>
+                  <a:txBody>
+                    <a:bodyPr/>
+                    <a:lstStyle/>
+                    <a:p>
+                      <a:r>
+                        <a:rPr lang="en-US" dirty="0" err="1" smtClean="0"/>
+                        <a:t>Sex:Cond</a:t>
+                      </a:r>
+                      <a:endParaRPr lang="en-US" dirty="0"/>
+                    </a:p>
+                  </a:txBody>
+                  <a:tcPr/>
+                </a:tc>
+                <a:tc>
+                  <a:txBody>
+                    <a:bodyPr/>
+                    <a:lstStyle/>
+                    <a:p>
+                      <a:r>
+                        <a:rPr lang="en-US" dirty="0" smtClean="0"/>
+                        <a:t>Sex</a:t>
+                      </a:r>
+                      <a:endParaRPr lang="en-US" dirty="0"/>
+                    </a:p>
+                  </a:txBody>
+                  <a:tcPr/>
+                </a:tc>
+                <a:tc>
+                  <a:txBody>
+                    <a:bodyPr/>
+                    <a:lstStyle/>
+                    <a:p>
+                      <a:r>
+                        <a:rPr lang="en-US" dirty="0" smtClean="0"/>
+                        <a:t>Cond</a:t>
+                      </a:r>
+                      <a:endParaRPr lang="en-US" dirty="0"/>
+                    </a:p>
+                  </a:txBody>
+                  <a:tcPr/>
+                </a:tc>
+                <a:tc>
+                  <a:txBody>
+                    <a:bodyPr/>
+                    <a:lstStyle/>
+                    <a:p>
+                      <a:r>
+                        <a:rPr lang="en-US" dirty="0" err="1" smtClean="0"/>
+                        <a:t>Sex:Cond</a:t>
+                      </a:r>
+                      <a:endParaRPr lang="en-US" dirty="0"/>
+                    </a:p>
+                  </a:txBody>
+                  <a:tcPr/>
+                </a:tc>
+              </a:tr>
+              <a:tr h="370840">
+                <a:tc>
+                  <a:txBody>
+                    <a:bodyPr/>
+                    <a:lstStyle/>
+                    <a:p>
+                      <a:r>
+                        <a:rPr lang="en-US" dirty="0" smtClean="0"/>
+                        <a:t>with Age</a:t>
+                      </a:r>
+                      <a:endParaRPr lang="en-US" dirty="0"/>
+                    </a:p>
+                  </a:txBody>
+                  <a:tcPr/>
+                </a:tc>
+                <a:tc>
+                  <a:txBody>
+                    <a:bodyPr/>
+                    <a:lstStyle/>
+                    <a:p>
+                      <a:r>
+                        <a:rPr lang="en-US" baseline="0" dirty="0" smtClean="0"/>
+                        <a:t>4 </a:t>
+                      </a:r>
+                      <a:r>
+                        <a:rPr lang="en-US" dirty="0" smtClean="0"/>
+                        <a:t>(35)</a:t>
+                      </a:r>
+                      <a:endParaRPr lang="en-US" dirty="0"/>
+                    </a:p>
+                  </a:txBody>
+                  <a:tcPr/>
+                </a:tc>
+                <a:tc>
+                  <a:txBody>
+                    <a:bodyPr/>
+                    <a:lstStyle/>
+                    <a:p>
+                      <a:r>
+                        <a:rPr lang="en-US" dirty="0" smtClean="0"/>
+                        <a:t>90 (372)</a:t>
+                      </a:r>
+                      <a:endParaRPr lang="en-US" dirty="0"/>
+                    </a:p>
+                  </a:txBody>
+                  <a:tcPr/>
+                </a:tc>
+                <a:tc>
+                  <a:txBody>
+                    <a:bodyPr/>
+                    <a:lstStyle/>
+                    <a:p>
+                      <a:r>
+                        <a:rPr lang="en-US" baseline="0" dirty="0" smtClean="0"/>
+                        <a:t>2 (31)</a:t>
+                      </a:r>
+                      <a:endParaRPr lang="en-US" dirty="0"/>
+                    </a:p>
+                  </a:txBody>
+                  <a:tcPr/>
+                </a:tc>
+                <a:tc>
+                  <a:txBody>
+                    <a:bodyPr/>
+                    <a:lstStyle/>
+                    <a:p>
+                      <a:r>
+                        <a:rPr lang="en-US" dirty="0" smtClean="0"/>
+                        <a:t>2 (34)</a:t>
+                      </a:r>
+                      <a:endParaRPr lang="en-US" dirty="0"/>
+                    </a:p>
+                  </a:txBody>
+                  <a:tcPr/>
+                </a:tc>
+                <a:tc>
+                  <a:txBody>
+                    <a:bodyPr/>
+                    <a:lstStyle/>
+                    <a:p>
+                      <a:r>
+                        <a:rPr lang="en-US" baseline="0" dirty="0" smtClean="0"/>
+                        <a:t>74 </a:t>
+                      </a:r>
+                      <a:r>
+                        <a:rPr lang="en-US" dirty="0" smtClean="0"/>
+                        <a:t>(441)</a:t>
+                      </a:r>
+                      <a:endParaRPr lang="en-US" dirty="0"/>
+                    </a:p>
+                  </a:txBody>
+                  <a:tcPr/>
+                </a:tc>
+                <a:tc>
+                  <a:txBody>
+                    <a:bodyPr/>
+                    <a:lstStyle/>
+                    <a:p>
+                      <a:r>
+                        <a:rPr lang="en-US" dirty="0" smtClean="0"/>
+                        <a:t>2 (29)</a:t>
+                      </a:r>
+                      <a:endParaRPr lang="en-US" dirty="0"/>
+                    </a:p>
+                  </a:txBody>
+                  <a:tcPr/>
+                </a:tc>
+              </a:tr>
+              <a:tr h="370840">
+                <a:tc>
+                  <a:txBody>
+                    <a:bodyPr/>
+                    <a:lstStyle/>
+                    <a:p>
+                      <a:r>
+                        <a:rPr lang="en-US" dirty="0" smtClean="0"/>
+                        <a:t>with</a:t>
+                      </a:r>
+                      <a:r>
+                        <a:rPr lang="en-US" baseline="0" dirty="0" smtClean="0"/>
+                        <a:t> TP53</a:t>
+                      </a:r>
+                      <a:endParaRPr lang="en-US" dirty="0"/>
+                    </a:p>
+                  </a:txBody>
+                  <a:tcPr/>
+                </a:tc>
+                <a:tc>
+                  <a:txBody>
+                    <a:bodyPr/>
+                    <a:lstStyle/>
+                    <a:p>
+                      <a:r>
+                        <a:rPr lang="en-US" dirty="0" smtClean="0"/>
+                        <a:t>5 (21)</a:t>
+                      </a:r>
+                      <a:endParaRPr lang="en-US" dirty="0"/>
+                    </a:p>
+                  </a:txBody>
+                  <a:tcPr/>
+                </a:tc>
+                <a:tc>
+                  <a:txBody>
+                    <a:bodyPr/>
+                    <a:lstStyle/>
+                    <a:p>
+                      <a:r>
+                        <a:rPr lang="en-US" dirty="0" smtClean="0"/>
+                        <a:t>381(1202)</a:t>
+                      </a:r>
+                      <a:endParaRPr lang="en-US" dirty="0"/>
+                    </a:p>
+                  </a:txBody>
+                  <a:tcPr/>
+                </a:tc>
+                <a:tc>
+                  <a:txBody>
+                    <a:bodyPr/>
+                    <a:lstStyle/>
+                    <a:p>
+                      <a:r>
+                        <a:rPr lang="en-US" dirty="0" smtClean="0"/>
+                        <a:t>4 (25)</a:t>
+                      </a:r>
+                      <a:endParaRPr lang="en-US" dirty="0"/>
+                    </a:p>
+                  </a:txBody>
+                  <a:tcPr/>
+                </a:tc>
+                <a:tc>
+                  <a:txBody>
+                    <a:bodyPr/>
+                    <a:lstStyle/>
+                    <a:p>
+                      <a:r>
+                        <a:rPr lang="en-US" dirty="0" smtClean="0"/>
+                        <a:t>3(38)</a:t>
+                      </a:r>
+                      <a:endParaRPr lang="en-US" dirty="0"/>
+                    </a:p>
+                  </a:txBody>
+                  <a:tcPr/>
+                </a:tc>
+                <a:tc>
+                  <a:txBody>
+                    <a:bodyPr/>
+                    <a:lstStyle/>
+                    <a:p>
+                      <a:r>
+                        <a:rPr lang="en-US" dirty="0" smtClean="0"/>
+                        <a:t>348 (1229)</a:t>
+                      </a:r>
+                      <a:endParaRPr lang="en-US" dirty="0"/>
+                    </a:p>
+                  </a:txBody>
+                  <a:tcPr/>
+                </a:tc>
+                <a:tc>
+                  <a:txBody>
+                    <a:bodyPr/>
+                    <a:lstStyle/>
+                    <a:p>
+                      <a:r>
+                        <a:rPr lang="en-US" dirty="0" smtClean="0"/>
+                        <a:t>2 (27)</a:t>
+                      </a:r>
+                      <a:endParaRPr lang="en-US" dirty="0"/>
+                    </a:p>
+                  </a:txBody>
+                  <a:tcPr/>
+                </a:tc>
+              </a:tr>
+              <a:tr h="370840">
+                <a:tc>
+                  <a:txBody>
+                    <a:bodyPr/>
+                    <a:lstStyle/>
+                    <a:p>
+                      <a:r>
+                        <a:rPr lang="en-US" dirty="0" smtClean="0"/>
+                        <a:t>with</a:t>
+                      </a:r>
+                      <a:r>
+                        <a:rPr lang="en-US" baseline="0" dirty="0" smtClean="0"/>
+                        <a:t> CTCF</a:t>
+                      </a:r>
+                      <a:endParaRPr lang="en-US" dirty="0"/>
+                    </a:p>
+                  </a:txBody>
+                  <a:tcPr/>
+                </a:tc>
+                <a:tc>
+                  <a:txBody>
+                    <a:bodyPr/>
+                    <a:lstStyle/>
+                    <a:p>
+                      <a:r>
+                        <a:rPr lang="en-US" dirty="0" smtClean="0"/>
+                        <a:t>7</a:t>
+                      </a:r>
+                      <a:r>
+                        <a:rPr lang="en-US" baseline="0" dirty="0" smtClean="0"/>
+                        <a:t> </a:t>
+                      </a:r>
+                      <a:r>
+                        <a:rPr lang="en-US" dirty="0" smtClean="0"/>
+                        <a:t>(58)</a:t>
+                      </a:r>
+                      <a:endParaRPr lang="en-US" dirty="0"/>
+                    </a:p>
+                  </a:txBody>
+                  <a:tcPr/>
+                </a:tc>
+                <a:tc>
+                  <a:txBody>
+                    <a:bodyPr/>
+                    <a:lstStyle/>
+                    <a:p>
+                      <a:r>
+                        <a:rPr lang="en-US" dirty="0" smtClean="0"/>
+                        <a:t>648</a:t>
+                      </a:r>
+                      <a:r>
+                        <a:rPr lang="en-US" baseline="0" dirty="0" smtClean="0"/>
+                        <a:t> </a:t>
+                      </a:r>
+                      <a:r>
+                        <a:rPr lang="en-US" dirty="0" smtClean="0"/>
+                        <a:t>(1777)</a:t>
+                      </a:r>
+                      <a:endParaRPr lang="en-US" dirty="0"/>
+                    </a:p>
+                  </a:txBody>
+                  <a:tcPr/>
+                </a:tc>
+                <a:tc>
+                  <a:txBody>
+                    <a:bodyPr/>
+                    <a:lstStyle/>
+                    <a:p>
+                      <a:r>
+                        <a:rPr lang="en-US" dirty="0" smtClean="0"/>
+                        <a:t>7 (59)</a:t>
+                      </a:r>
+                      <a:endParaRPr lang="en-US" dirty="0"/>
+                    </a:p>
+                  </a:txBody>
+                  <a:tcPr/>
+                </a:tc>
+                <a:tc>
+                  <a:txBody>
+                    <a:bodyPr/>
+                    <a:lstStyle/>
+                    <a:p>
+                      <a:r>
+                        <a:rPr lang="en-US" dirty="0" smtClean="0"/>
+                        <a:t>8 (38)</a:t>
+                      </a:r>
+                      <a:endParaRPr lang="en-US" dirty="0"/>
+                    </a:p>
+                  </a:txBody>
+                  <a:tcPr/>
+                </a:tc>
+                <a:tc>
+                  <a:txBody>
+                    <a:bodyPr/>
+                    <a:lstStyle/>
+                    <a:p>
+                      <a:r>
+                        <a:rPr lang="en-US" dirty="0" smtClean="0"/>
+                        <a:t>621 (1648)</a:t>
+                      </a:r>
+                      <a:endParaRPr lang="en-US" dirty="0"/>
+                    </a:p>
+                  </a:txBody>
+                  <a:tcPr/>
+                </a:tc>
+                <a:tc>
+                  <a:txBody>
+                    <a:bodyPr/>
+                    <a:lstStyle/>
+                    <a:p>
+                      <a:r>
+                        <a:rPr lang="en-US" dirty="0" smtClean="0"/>
+                        <a:t>5 (34)</a:t>
+                      </a:r>
+                      <a:endParaRPr lang="en-US" dirty="0"/>
+                    </a:p>
+                  </a:txBody>
+                  <a:tcPr/>
+                </a:tc>
+              </a:tr>
+            </a:tbl>
+          </a:graphicData>
+        </a:graphic>
+      </p:graphicFrame>
+      <p:sp>
+        <p:nvSpPr>
+          <p:cNvPr id="5" name="Rectangle 4"/>
+          <p:cNvSpPr/>
+          <p:nvPr/>
+        </p:nvSpPr>
+        <p:spPr>
+          <a:xfrm>
+            <a:off x="6019800" y="4553221"/>
+            <a:ext cx="2606611" cy="923330"/>
+          </a:xfrm>
+          <a:prstGeom prst="rect">
+            <a:avLst/>
+          </a:prstGeom>
+        </p:spPr>
+        <p:txBody>
+          <a:bodyPr wrap="none">
+            <a:spAutoFit/>
+          </a:bodyPr>
+          <a:lstStyle/>
+          <a:p>
+            <a:r>
+              <a:rPr lang="en-US" dirty="0" smtClean="0"/>
+              <a:t>Using q-values </a:t>
+            </a:r>
+            <a:r>
+              <a:rPr lang="en-US" dirty="0"/>
+              <a:t>0.05 (0.25</a:t>
+            </a:r>
+            <a:r>
+              <a:rPr lang="en-US" dirty="0" smtClean="0"/>
+              <a:t>)</a:t>
+            </a:r>
+          </a:p>
+          <a:p>
+            <a:endParaRPr lang="en-US" dirty="0"/>
+          </a:p>
+          <a:p>
+            <a:r>
+              <a:rPr lang="en-US" smtClean="0"/>
+              <a:t>Run permuted</a:t>
+            </a:r>
+            <a:endParaRPr lang="en-US" dirty="0"/>
+          </a:p>
+        </p:txBody>
+      </p:sp>
+    </p:spTree>
+    <p:extLst>
+      <p:ext uri="{BB962C8B-B14F-4D97-AF65-F5344CB8AC3E}">
+        <p14:creationId xmlns:p14="http://schemas.microsoft.com/office/powerpoint/2010/main" val="3486659752"/>
       </p:ext>
     </p:extLst>
   </p:cSld>

</xml_diff>